<commit_message>
update gift card amount
</commit_message>
<xml_diff>
--- a/study/Tutorial.pptx
+++ b/study/Tutorial.pptx
@@ -70,8 +70,8 @@
     <p:sldId id="327" r:id="rId64"/>
     <p:sldId id="328" r:id="rId65"/>
     <p:sldId id="331" r:id="rId66"/>
-    <p:sldId id="330" r:id="rId67"/>
-    <p:sldId id="332" r:id="rId68"/>
+    <p:sldId id="332" r:id="rId67"/>
+    <p:sldId id="337" r:id="rId68"/>
     <p:sldId id="312" r:id="rId69"/>
     <p:sldId id="285" r:id="rId70"/>
     <p:sldId id="286" r:id="rId71"/>
@@ -6470,7 +6470,7 @@
         <a:p>
           <a:r>
             <a:rPr lang="en-US" dirty="0"/>
-            <a:t>+10</a:t>
+            <a:t>+40</a:t>
           </a:r>
         </a:p>
       </dgm:t>
@@ -6506,7 +6506,7 @@
         <a:p>
           <a:r>
             <a:rPr lang="en-US" dirty="0"/>
-            <a:t>Performance: Best earners</a:t>
+            <a:t>Leaderboard: $10 for first place and $5 for second place</a:t>
           </a:r>
         </a:p>
       </dgm:t>
@@ -6641,6 +6641,78 @@
         </a:p>
       </dgm:t>
     </dgm:pt>
+    <dgm:pt modelId="{541AF274-8491-4EA1-9F9B-77AB4F499F47}">
+      <dgm:prSet phldrT="[Text]"/>
+      <dgm:spPr/>
+      <dgm:t>
+        <a:bodyPr/>
+        <a:lstStyle/>
+        <a:p>
+          <a:r>
+            <a:rPr lang="en-US" dirty="0"/>
+            <a:t>Fourth</a:t>
+          </a:r>
+        </a:p>
+      </dgm:t>
+    </dgm:pt>
+    <dgm:pt modelId="{65B75713-1D6C-43E3-A956-B13D22E85595}" type="parTrans" cxnId="{9B839B1E-DE81-4221-80B6-1CA045C0BBC2}">
+      <dgm:prSet/>
+      <dgm:spPr/>
+      <dgm:t>
+        <a:bodyPr/>
+        <a:lstStyle/>
+        <a:p>
+          <a:endParaRPr lang="en-US"/>
+        </a:p>
+      </dgm:t>
+    </dgm:pt>
+    <dgm:pt modelId="{E8BA43FA-5FA8-4591-B996-1E0058D9CEBD}" type="sibTrans" cxnId="{9B839B1E-DE81-4221-80B6-1CA045C0BBC2}">
+      <dgm:prSet/>
+      <dgm:spPr/>
+      <dgm:t>
+        <a:bodyPr/>
+        <a:lstStyle/>
+        <a:p>
+          <a:endParaRPr lang="en-US"/>
+        </a:p>
+      </dgm:t>
+    </dgm:pt>
+    <dgm:pt modelId="{104A2C68-A90B-4B1C-B5D4-589F99396C07}">
+      <dgm:prSet phldrT="[Text]"/>
+      <dgm:spPr/>
+      <dgm:t>
+        <a:bodyPr/>
+        <a:lstStyle/>
+        <a:p>
+          <a:r>
+            <a:rPr lang="en-US" dirty="0"/>
+            <a:t>+20</a:t>
+          </a:r>
+        </a:p>
+      </dgm:t>
+    </dgm:pt>
+    <dgm:pt modelId="{4DCAE372-5236-4184-B69E-70067BDABFE1}" type="parTrans" cxnId="{F96E9675-45AD-4733-BFE8-C4D72538FFF1}">
+      <dgm:prSet/>
+      <dgm:spPr/>
+      <dgm:t>
+        <a:bodyPr/>
+        <a:lstStyle/>
+        <a:p>
+          <a:endParaRPr lang="en-US"/>
+        </a:p>
+      </dgm:t>
+    </dgm:pt>
+    <dgm:pt modelId="{D9769C0C-9F4B-49B9-AA16-485E0B8DE665}" type="sibTrans" cxnId="{F96E9675-45AD-4733-BFE8-C4D72538FFF1}">
+      <dgm:prSet/>
+      <dgm:spPr/>
+      <dgm:t>
+        <a:bodyPr/>
+        <a:lstStyle/>
+        <a:p>
+          <a:endParaRPr lang="en-US"/>
+        </a:p>
+      </dgm:t>
+    </dgm:pt>
     <dgm:pt modelId="{4E7A2DC7-AA24-404F-805B-5D5DCFD2EACE}" type="pres">
       <dgm:prSet presAssocID="{9DB8C021-F794-4349-85F2-2796D1EFD560}" presName="linearFlow" presStyleCnt="0">
         <dgm:presLayoutVars>
@@ -6656,7 +6728,7 @@
       <dgm:spPr/>
     </dgm:pt>
     <dgm:pt modelId="{07D44AA1-640C-4C62-B69B-770B9AFAD5DE}" type="pres">
-      <dgm:prSet presAssocID="{A5ABA7AD-E0F4-420F-A7DA-5D54B812F95F}" presName="parentText" presStyleLbl="alignNode1" presStyleIdx="0" presStyleCnt="5">
+      <dgm:prSet presAssocID="{A5ABA7AD-E0F4-420F-A7DA-5D54B812F95F}" presName="parentText" presStyleLbl="alignNode1" presStyleIdx="0" presStyleCnt="6">
         <dgm:presLayoutVars>
           <dgm:chMax val="1"/>
           <dgm:bulletEnabled val="1"/>
@@ -6665,7 +6737,7 @@
       <dgm:spPr/>
     </dgm:pt>
     <dgm:pt modelId="{162E096D-52CE-47A1-B91B-5CEA2F187917}" type="pres">
-      <dgm:prSet presAssocID="{A5ABA7AD-E0F4-420F-A7DA-5D54B812F95F}" presName="descendantText" presStyleLbl="alignAcc1" presStyleIdx="0" presStyleCnt="5">
+      <dgm:prSet presAssocID="{A5ABA7AD-E0F4-420F-A7DA-5D54B812F95F}" presName="descendantText" presStyleLbl="alignAcc1" presStyleIdx="0" presStyleCnt="6">
         <dgm:presLayoutVars>
           <dgm:bulletEnabled val="1"/>
         </dgm:presLayoutVars>
@@ -6681,7 +6753,7 @@
       <dgm:spPr/>
     </dgm:pt>
     <dgm:pt modelId="{61A54C54-172D-4CDD-BC29-B98D8F42DBBB}" type="pres">
-      <dgm:prSet presAssocID="{F7E41A03-3469-4D15-AD9B-803880362CC6}" presName="parentText" presStyleLbl="alignNode1" presStyleIdx="1" presStyleCnt="5">
+      <dgm:prSet presAssocID="{F7E41A03-3469-4D15-AD9B-803880362CC6}" presName="parentText" presStyleLbl="alignNode1" presStyleIdx="1" presStyleCnt="6">
         <dgm:presLayoutVars>
           <dgm:chMax val="1"/>
           <dgm:bulletEnabled val="1"/>
@@ -6690,7 +6762,7 @@
       <dgm:spPr/>
     </dgm:pt>
     <dgm:pt modelId="{3A37B327-F866-4826-98CA-0A915B9DACF2}" type="pres">
-      <dgm:prSet presAssocID="{F7E41A03-3469-4D15-AD9B-803880362CC6}" presName="descendantText" presStyleLbl="alignAcc1" presStyleIdx="1" presStyleCnt="5">
+      <dgm:prSet presAssocID="{F7E41A03-3469-4D15-AD9B-803880362CC6}" presName="descendantText" presStyleLbl="alignAcc1" presStyleIdx="1" presStyleCnt="6">
         <dgm:presLayoutVars>
           <dgm:bulletEnabled val="1"/>
         </dgm:presLayoutVars>
@@ -6706,7 +6778,7 @@
       <dgm:spPr/>
     </dgm:pt>
     <dgm:pt modelId="{0F7B292B-11B2-4106-9D6D-DD080EA48D5B}" type="pres">
-      <dgm:prSet presAssocID="{4AF6F5AD-1361-4BDB-A026-97CFB2DD7749}" presName="parentText" presStyleLbl="alignNode1" presStyleIdx="2" presStyleCnt="5">
+      <dgm:prSet presAssocID="{4AF6F5AD-1361-4BDB-A026-97CFB2DD7749}" presName="parentText" presStyleLbl="alignNode1" presStyleIdx="2" presStyleCnt="6">
         <dgm:presLayoutVars>
           <dgm:chMax val="1"/>
           <dgm:bulletEnabled val="1"/>
@@ -6715,7 +6787,7 @@
       <dgm:spPr/>
     </dgm:pt>
     <dgm:pt modelId="{3B67A9E2-DFF8-4E7F-9AFA-6BBA20580329}" type="pres">
-      <dgm:prSet presAssocID="{4AF6F5AD-1361-4BDB-A026-97CFB2DD7749}" presName="descendantText" presStyleLbl="alignAcc1" presStyleIdx="2" presStyleCnt="5">
+      <dgm:prSet presAssocID="{4AF6F5AD-1361-4BDB-A026-97CFB2DD7749}" presName="descendantText" presStyleLbl="alignAcc1" presStyleIdx="2" presStyleCnt="6">
         <dgm:presLayoutVars>
           <dgm:bulletEnabled val="1"/>
         </dgm:presLayoutVars>
@@ -6726,12 +6798,37 @@
       <dgm:prSet presAssocID="{632CA0DA-0699-41A3-AACA-2C8A175B07E7}" presName="sp" presStyleCnt="0"/>
       <dgm:spPr/>
     </dgm:pt>
+    <dgm:pt modelId="{B48EFC29-18DB-4F1C-8553-E59582033FCC}" type="pres">
+      <dgm:prSet presAssocID="{104A2C68-A90B-4B1C-B5D4-589F99396C07}" presName="composite" presStyleCnt="0"/>
+      <dgm:spPr/>
+    </dgm:pt>
+    <dgm:pt modelId="{5242CE44-08F7-47DF-9DC7-6830D97AF155}" type="pres">
+      <dgm:prSet presAssocID="{104A2C68-A90B-4B1C-B5D4-589F99396C07}" presName="parentText" presStyleLbl="alignNode1" presStyleIdx="3" presStyleCnt="6">
+        <dgm:presLayoutVars>
+          <dgm:chMax val="1"/>
+          <dgm:bulletEnabled val="1"/>
+        </dgm:presLayoutVars>
+      </dgm:prSet>
+      <dgm:spPr/>
+    </dgm:pt>
+    <dgm:pt modelId="{BCB1B1A9-05C0-4069-B1B2-CB760D54E3BC}" type="pres">
+      <dgm:prSet presAssocID="{104A2C68-A90B-4B1C-B5D4-589F99396C07}" presName="descendantText" presStyleLbl="alignAcc1" presStyleIdx="3" presStyleCnt="6">
+        <dgm:presLayoutVars>
+          <dgm:bulletEnabled val="1"/>
+        </dgm:presLayoutVars>
+      </dgm:prSet>
+      <dgm:spPr/>
+    </dgm:pt>
+    <dgm:pt modelId="{7AFFC59D-E18A-4E0B-950A-65101995BEE6}" type="pres">
+      <dgm:prSet presAssocID="{D9769C0C-9F4B-49B9-AA16-485E0B8DE665}" presName="sp" presStyleCnt="0"/>
+      <dgm:spPr/>
+    </dgm:pt>
     <dgm:pt modelId="{718431D9-9891-4FB4-85C0-0029B391B9CA}" type="pres">
       <dgm:prSet presAssocID="{DB63C788-DA99-47BB-9930-5C6E50A2B3AC}" presName="composite" presStyleCnt="0"/>
       <dgm:spPr/>
     </dgm:pt>
     <dgm:pt modelId="{B3BF44CF-19CD-479A-834F-9A8FE8BE3231}" type="pres">
-      <dgm:prSet presAssocID="{DB63C788-DA99-47BB-9930-5C6E50A2B3AC}" presName="parentText" presStyleLbl="alignNode1" presStyleIdx="3" presStyleCnt="5">
+      <dgm:prSet presAssocID="{DB63C788-DA99-47BB-9930-5C6E50A2B3AC}" presName="parentText" presStyleLbl="alignNode1" presStyleIdx="4" presStyleCnt="6">
         <dgm:presLayoutVars>
           <dgm:chMax val="1"/>
           <dgm:bulletEnabled val="1"/>
@@ -6740,7 +6837,7 @@
       <dgm:spPr/>
     </dgm:pt>
     <dgm:pt modelId="{6443F1A0-166F-49CC-88CC-0A56B84EFEA4}" type="pres">
-      <dgm:prSet presAssocID="{DB63C788-DA99-47BB-9930-5C6E50A2B3AC}" presName="descendantText" presStyleLbl="alignAcc1" presStyleIdx="3" presStyleCnt="5">
+      <dgm:prSet presAssocID="{DB63C788-DA99-47BB-9930-5C6E50A2B3AC}" presName="descendantText" presStyleLbl="alignAcc1" presStyleIdx="4" presStyleCnt="6">
         <dgm:presLayoutVars>
           <dgm:bulletEnabled val="1"/>
         </dgm:presLayoutVars>
@@ -6756,7 +6853,7 @@
       <dgm:spPr/>
     </dgm:pt>
     <dgm:pt modelId="{199B0682-B030-4CF0-AFCF-1960E2C41ECD}" type="pres">
-      <dgm:prSet presAssocID="{B5E2C722-09F0-4EA1-A21D-625A0D299965}" presName="parentText" presStyleLbl="alignNode1" presStyleIdx="4" presStyleCnt="5">
+      <dgm:prSet presAssocID="{B5E2C722-09F0-4EA1-A21D-625A0D299965}" presName="parentText" presStyleLbl="alignNode1" presStyleIdx="5" presStyleCnt="6">
         <dgm:presLayoutVars>
           <dgm:chMax val="1"/>
           <dgm:bulletEnabled val="1"/>
@@ -6765,7 +6862,7 @@
       <dgm:spPr/>
     </dgm:pt>
     <dgm:pt modelId="{156F03FE-ABAA-4736-B27F-696CC0E5EC5F}" type="pres">
-      <dgm:prSet presAssocID="{B5E2C722-09F0-4EA1-A21D-625A0D299965}" presName="descendantText" presStyleLbl="alignAcc1" presStyleIdx="4" presStyleCnt="5">
+      <dgm:prSet presAssocID="{B5E2C722-09F0-4EA1-A21D-625A0D299965}" presName="descendantText" presStyleLbl="alignAcc1" presStyleIdx="5" presStyleCnt="6">
         <dgm:presLayoutVars>
           <dgm:bulletEnabled val="1"/>
         </dgm:presLayoutVars>
@@ -6777,17 +6874,21 @@
     <dgm:cxn modelId="{67D1F102-092E-4868-B604-F4B027AD9559}" srcId="{B5E2C722-09F0-4EA1-A21D-625A0D299965}" destId="{FFF2CFE3-B4D0-4027-93F9-7D49B21165C6}" srcOrd="0" destOrd="0" parTransId="{12BAAD3B-6243-44B8-9F53-9F35EFE3C62F}" sibTransId="{F543E65D-A0F6-453A-91D1-F0C044F578D3}"/>
     <dgm:cxn modelId="{AAC69209-06F6-4B82-A68C-A85FB2D955B5}" srcId="{F7E41A03-3469-4D15-AD9B-803880362CC6}" destId="{856C3D4B-F753-46C1-BAF0-40DEE2A73316}" srcOrd="0" destOrd="0" parTransId="{C1B9C4D1-4815-4CE9-AEF9-B26BE6022997}" sibTransId="{AC634543-1D3D-4B16-BE0F-0B7A28EC8BE1}"/>
     <dgm:cxn modelId="{BC8EC40E-11EC-43B6-984F-FD381B6B0AFC}" type="presOf" srcId="{B5E2C722-09F0-4EA1-A21D-625A0D299965}" destId="{199B0682-B030-4CF0-AFCF-1960E2C41ECD}" srcOrd="0" destOrd="0" presId="urn:microsoft.com/office/officeart/2005/8/layout/chevron2"/>
+    <dgm:cxn modelId="{9B839B1E-DE81-4221-80B6-1CA045C0BBC2}" srcId="{104A2C68-A90B-4B1C-B5D4-589F99396C07}" destId="{541AF274-8491-4EA1-9F9B-77AB4F499F47}" srcOrd="0" destOrd="0" parTransId="{65B75713-1D6C-43E3-A956-B13D22E85595}" sibTransId="{E8BA43FA-5FA8-4591-B996-1E0058D9CEBD}"/>
     <dgm:cxn modelId="{D5859F23-DDB4-4FE2-968E-D512AF5EDC2A}" type="presOf" srcId="{443078CE-910E-438A-9C52-287D44D8954B}" destId="{3B67A9E2-DFF8-4E7F-9AFA-6BBA20580329}" srcOrd="0" destOrd="0" presId="urn:microsoft.com/office/officeart/2005/8/layout/chevron2"/>
     <dgm:cxn modelId="{FA62B827-951D-45CD-8DA1-AD9B7775CB3E}" type="presOf" srcId="{DB63C788-DA99-47BB-9930-5C6E50A2B3AC}" destId="{B3BF44CF-19CD-479A-834F-9A8FE8BE3231}" srcOrd="0" destOrd="0" presId="urn:microsoft.com/office/officeart/2005/8/layout/chevron2"/>
     <dgm:cxn modelId="{DEB3BD32-8559-4284-B385-523471B5A8BE}" type="presOf" srcId="{5B7F4060-A8DE-46B4-9127-2C445015EE48}" destId="{162E096D-52CE-47A1-B91B-5CEA2F187917}" srcOrd="0" destOrd="0" presId="urn:microsoft.com/office/officeart/2005/8/layout/chevron2"/>
     <dgm:cxn modelId="{8329ED37-A4CA-4DF8-B6BD-DEA5C712DFA6}" srcId="{A5ABA7AD-E0F4-420F-A7DA-5D54B812F95F}" destId="{5B7F4060-A8DE-46B4-9127-2C445015EE48}" srcOrd="0" destOrd="0" parTransId="{B7A49974-3598-45F1-A996-2A5597BADA93}" sibTransId="{C912C51B-7A8B-4396-A4D1-C1FB754043B7}"/>
     <dgm:cxn modelId="{EE46A25C-112E-4E45-9161-336553A9D2E9}" type="presOf" srcId="{FFF2CFE3-B4D0-4027-93F9-7D49B21165C6}" destId="{156F03FE-ABAA-4736-B27F-696CC0E5EC5F}" srcOrd="0" destOrd="0" presId="urn:microsoft.com/office/officeart/2005/8/layout/chevron2"/>
+    <dgm:cxn modelId="{9A932841-6ACB-488A-9ED2-CC19147D0A2E}" type="presOf" srcId="{541AF274-8491-4EA1-9F9B-77AB4F499F47}" destId="{BCB1B1A9-05C0-4069-B1B2-CB760D54E3BC}" srcOrd="0" destOrd="0" presId="urn:microsoft.com/office/officeart/2005/8/layout/chevron2"/>
+    <dgm:cxn modelId="{90934268-0C8A-4C7F-94CC-AD4AD3AA4B34}" type="presOf" srcId="{104A2C68-A90B-4B1C-B5D4-589F99396C07}" destId="{5242CE44-08F7-47DF-9DC7-6830D97AF155}" srcOrd="0" destOrd="0" presId="urn:microsoft.com/office/officeart/2005/8/layout/chevron2"/>
     <dgm:cxn modelId="{CE107E74-199D-42D9-A370-39EBBD793C19}" type="presOf" srcId="{4AF6F5AD-1361-4BDB-A026-97CFB2DD7749}" destId="{0F7B292B-11B2-4106-9D6D-DD080EA48D5B}" srcOrd="0" destOrd="0" presId="urn:microsoft.com/office/officeart/2005/8/layout/chevron2"/>
+    <dgm:cxn modelId="{F96E9675-45AD-4733-BFE8-C4D72538FFF1}" srcId="{9DB8C021-F794-4349-85F2-2796D1EFD560}" destId="{104A2C68-A90B-4B1C-B5D4-589F99396C07}" srcOrd="3" destOrd="0" parTransId="{4DCAE372-5236-4184-B69E-70067BDABFE1}" sibTransId="{D9769C0C-9F4B-49B9-AA16-485E0B8DE665}"/>
     <dgm:cxn modelId="{B465287F-AE69-45C2-B94E-1BB35845805B}" srcId="{9DB8C021-F794-4349-85F2-2796D1EFD560}" destId="{4AF6F5AD-1361-4BDB-A026-97CFB2DD7749}" srcOrd="2" destOrd="0" parTransId="{B92A96F8-90D8-4D7A-B78B-20E45DAA78E0}" sibTransId="{632CA0DA-0699-41A3-AACA-2C8A175B07E7}"/>
-    <dgm:cxn modelId="{F50CB794-2373-474A-ABB3-30D01B31EE5A}" srcId="{9DB8C021-F794-4349-85F2-2796D1EFD560}" destId="{DB63C788-DA99-47BB-9930-5C6E50A2B3AC}" srcOrd="3" destOrd="0" parTransId="{16488015-DE7F-4F69-AD60-C2CF51C5A713}" sibTransId="{227724F9-EE11-41B2-882F-DCF1FB1A4FD5}"/>
+    <dgm:cxn modelId="{F50CB794-2373-474A-ABB3-30D01B31EE5A}" srcId="{9DB8C021-F794-4349-85F2-2796D1EFD560}" destId="{DB63C788-DA99-47BB-9930-5C6E50A2B3AC}" srcOrd="4" destOrd="0" parTransId="{16488015-DE7F-4F69-AD60-C2CF51C5A713}" sibTransId="{227724F9-EE11-41B2-882F-DCF1FB1A4FD5}"/>
     <dgm:cxn modelId="{C0DDA19C-6B34-498E-8785-CE01F16F6593}" type="presOf" srcId="{856C3D4B-F753-46C1-BAF0-40DEE2A73316}" destId="{3A37B327-F866-4826-98CA-0A915B9DACF2}" srcOrd="0" destOrd="0" presId="urn:microsoft.com/office/officeart/2005/8/layout/chevron2"/>
     <dgm:cxn modelId="{F8E7659D-90F8-4972-8CDD-753CC5EBC72D}" type="presOf" srcId="{A5ABA7AD-E0F4-420F-A7DA-5D54B812F95F}" destId="{07D44AA1-640C-4C62-B69B-770B9AFAD5DE}" srcOrd="0" destOrd="0" presId="urn:microsoft.com/office/officeart/2005/8/layout/chevron2"/>
-    <dgm:cxn modelId="{3D0CF1AF-4F4E-4985-9E00-9D32ACD74507}" srcId="{9DB8C021-F794-4349-85F2-2796D1EFD560}" destId="{B5E2C722-09F0-4EA1-A21D-625A0D299965}" srcOrd="4" destOrd="0" parTransId="{02024CC8-3561-4436-9833-E665D9B0E90E}" sibTransId="{3E92D148-501D-4AAD-9EDA-958B6155F651}"/>
+    <dgm:cxn modelId="{3D0CF1AF-4F4E-4985-9E00-9D32ACD74507}" srcId="{9DB8C021-F794-4349-85F2-2796D1EFD560}" destId="{B5E2C722-09F0-4EA1-A21D-625A0D299965}" srcOrd="5" destOrd="0" parTransId="{02024CC8-3561-4436-9833-E665D9B0E90E}" sibTransId="{3E92D148-501D-4AAD-9EDA-958B6155F651}"/>
     <dgm:cxn modelId="{187E65BC-8716-45B9-8C42-EDC2050B1DEE}" srcId="{4AF6F5AD-1361-4BDB-A026-97CFB2DD7749}" destId="{443078CE-910E-438A-9C52-287D44D8954B}" srcOrd="0" destOrd="0" parTransId="{F411DA96-8A48-4EA2-9EF3-BBF4938B9ABA}" sibTransId="{4983119A-0CF9-43EE-909B-A633778A787F}"/>
     <dgm:cxn modelId="{DC1921BE-A532-494B-9C5E-9C1F35A0DBFD}" srcId="{9DB8C021-F794-4349-85F2-2796D1EFD560}" destId="{A5ABA7AD-E0F4-420F-A7DA-5D54B812F95F}" srcOrd="0" destOrd="0" parTransId="{09E9BF7D-6E0B-4FB1-AFDE-10B771F48AC6}" sibTransId="{0D69BF33-4193-470F-907E-182A52CF5C33}"/>
     <dgm:cxn modelId="{EA64FCC4-09D3-4C5D-8F00-9D8C2E14B280}" type="presOf" srcId="{9DB8C021-F794-4349-85F2-2796D1EFD560}" destId="{4E7A2DC7-AA24-404F-805B-5D5DCFD2EACE}" srcOrd="0" destOrd="0" presId="urn:microsoft.com/office/officeart/2005/8/layout/chevron2"/>
@@ -6807,11 +6908,15 @@
     <dgm:cxn modelId="{FCD49A4F-6F02-4687-B731-2E486D09FEAE}" type="presParOf" srcId="{681F3FE5-1A99-466F-AE0A-2DD0D8477722}" destId="{0F7B292B-11B2-4106-9D6D-DD080EA48D5B}" srcOrd="0" destOrd="0" presId="urn:microsoft.com/office/officeart/2005/8/layout/chevron2"/>
     <dgm:cxn modelId="{D4ABF99C-E60C-4B93-B098-4B9C95EA1640}" type="presParOf" srcId="{681F3FE5-1A99-466F-AE0A-2DD0D8477722}" destId="{3B67A9E2-DFF8-4E7F-9AFA-6BBA20580329}" srcOrd="1" destOrd="0" presId="urn:microsoft.com/office/officeart/2005/8/layout/chevron2"/>
     <dgm:cxn modelId="{E5E8A474-DC1B-440F-A656-40271890D1AF}" type="presParOf" srcId="{4E7A2DC7-AA24-404F-805B-5D5DCFD2EACE}" destId="{BE396E7D-E235-4D43-BE37-082CAD9869BF}" srcOrd="5" destOrd="0" presId="urn:microsoft.com/office/officeart/2005/8/layout/chevron2"/>
-    <dgm:cxn modelId="{A6A38C04-C591-4B0F-B80B-3C3CC23C2063}" type="presParOf" srcId="{4E7A2DC7-AA24-404F-805B-5D5DCFD2EACE}" destId="{718431D9-9891-4FB4-85C0-0029B391B9CA}" srcOrd="6" destOrd="0" presId="urn:microsoft.com/office/officeart/2005/8/layout/chevron2"/>
+    <dgm:cxn modelId="{CA990179-32F8-47E6-B790-1AD69E6461FA}" type="presParOf" srcId="{4E7A2DC7-AA24-404F-805B-5D5DCFD2EACE}" destId="{B48EFC29-18DB-4F1C-8553-E59582033FCC}" srcOrd="6" destOrd="0" presId="urn:microsoft.com/office/officeart/2005/8/layout/chevron2"/>
+    <dgm:cxn modelId="{78AF9621-E38F-4F50-BAFF-BDCA1BEB6D84}" type="presParOf" srcId="{B48EFC29-18DB-4F1C-8553-E59582033FCC}" destId="{5242CE44-08F7-47DF-9DC7-6830D97AF155}" srcOrd="0" destOrd="0" presId="urn:microsoft.com/office/officeart/2005/8/layout/chevron2"/>
+    <dgm:cxn modelId="{9E9F3D2D-A4A0-4FC9-8900-EC63519B46C3}" type="presParOf" srcId="{B48EFC29-18DB-4F1C-8553-E59582033FCC}" destId="{BCB1B1A9-05C0-4069-B1B2-CB760D54E3BC}" srcOrd="1" destOrd="0" presId="urn:microsoft.com/office/officeart/2005/8/layout/chevron2"/>
+    <dgm:cxn modelId="{555DACDD-3445-4C3C-85D3-F74002C23A1C}" type="presParOf" srcId="{4E7A2DC7-AA24-404F-805B-5D5DCFD2EACE}" destId="{7AFFC59D-E18A-4E0B-950A-65101995BEE6}" srcOrd="7" destOrd="0" presId="urn:microsoft.com/office/officeart/2005/8/layout/chevron2"/>
+    <dgm:cxn modelId="{A6A38C04-C591-4B0F-B80B-3C3CC23C2063}" type="presParOf" srcId="{4E7A2DC7-AA24-404F-805B-5D5DCFD2EACE}" destId="{718431D9-9891-4FB4-85C0-0029B391B9CA}" srcOrd="8" destOrd="0" presId="urn:microsoft.com/office/officeart/2005/8/layout/chevron2"/>
     <dgm:cxn modelId="{83C7EA4D-30E0-4282-BA7E-8D849838DCDA}" type="presParOf" srcId="{718431D9-9891-4FB4-85C0-0029B391B9CA}" destId="{B3BF44CF-19CD-479A-834F-9A8FE8BE3231}" srcOrd="0" destOrd="0" presId="urn:microsoft.com/office/officeart/2005/8/layout/chevron2"/>
     <dgm:cxn modelId="{05C9F7DA-C563-4E5D-B23D-A1210A57F111}" type="presParOf" srcId="{718431D9-9891-4FB4-85C0-0029B391B9CA}" destId="{6443F1A0-166F-49CC-88CC-0A56B84EFEA4}" srcOrd="1" destOrd="0" presId="urn:microsoft.com/office/officeart/2005/8/layout/chevron2"/>
-    <dgm:cxn modelId="{2F90C798-FB7A-4A57-8460-EB0D533128D5}" type="presParOf" srcId="{4E7A2DC7-AA24-404F-805B-5D5DCFD2EACE}" destId="{586D3BD9-12FA-4B4C-BCE0-D5B4B4011B42}" srcOrd="7" destOrd="0" presId="urn:microsoft.com/office/officeart/2005/8/layout/chevron2"/>
-    <dgm:cxn modelId="{AFAEEFA7-833E-4E83-8332-11D3BAD48171}" type="presParOf" srcId="{4E7A2DC7-AA24-404F-805B-5D5DCFD2EACE}" destId="{52BBB839-3B6D-4FEC-96EC-CD817C18AD71}" srcOrd="8" destOrd="0" presId="urn:microsoft.com/office/officeart/2005/8/layout/chevron2"/>
+    <dgm:cxn modelId="{2F90C798-FB7A-4A57-8460-EB0D533128D5}" type="presParOf" srcId="{4E7A2DC7-AA24-404F-805B-5D5DCFD2EACE}" destId="{586D3BD9-12FA-4B4C-BCE0-D5B4B4011B42}" srcOrd="9" destOrd="0" presId="urn:microsoft.com/office/officeart/2005/8/layout/chevron2"/>
+    <dgm:cxn modelId="{AFAEEFA7-833E-4E83-8332-11D3BAD48171}" type="presParOf" srcId="{4E7A2DC7-AA24-404F-805B-5D5DCFD2EACE}" destId="{52BBB839-3B6D-4FEC-96EC-CD817C18AD71}" srcOrd="10" destOrd="0" presId="urn:microsoft.com/office/officeart/2005/8/layout/chevron2"/>
     <dgm:cxn modelId="{98A2B770-B9C0-4DEC-AA9D-C4E695F92486}" type="presParOf" srcId="{52BBB839-3B6D-4FEC-96EC-CD817C18AD71}" destId="{199B0682-B030-4CF0-AFCF-1960E2C41ECD}" srcOrd="0" destOrd="0" presId="urn:microsoft.com/office/officeart/2005/8/layout/chevron2"/>
     <dgm:cxn modelId="{5D252365-6102-402B-8CEF-A83F443E4029}" type="presParOf" srcId="{52BBB839-3B6D-4FEC-96EC-CD817C18AD71}" destId="{156F03FE-ABAA-4736-B27F-696CC0E5EC5F}" srcOrd="1" destOrd="0" presId="urn:microsoft.com/office/officeart/2005/8/layout/chevron2"/>
   </dgm:cxnLst>
@@ -8773,8 +8878,8 @@
       </dsp:nvSpPr>
       <dsp:spPr>
         <a:xfrm rot="5400000">
-          <a:off x="-144690" y="146350"/>
-          <a:ext cx="964603" cy="675222"/>
+          <a:off x="-121106" y="123128"/>
+          <a:ext cx="807377" cy="565164"/>
         </a:xfrm>
         <a:prstGeom prst="chevron">
           <a:avLst/>
@@ -8816,12 +8921,12 @@
         </a:fontRef>
       </dsp:style>
       <dsp:txBody>
-        <a:bodyPr spcFirstLastPara="0" vert="horz" wrap="square" lIns="12065" tIns="12065" rIns="12065" bIns="12065" numCol="1" spcCol="1270" anchor="ctr" anchorCtr="0">
+        <a:bodyPr spcFirstLastPara="0" vert="horz" wrap="square" lIns="9525" tIns="9525" rIns="9525" bIns="9525" numCol="1" spcCol="1270" anchor="ctr" anchorCtr="0">
           <a:noAutofit/>
         </a:bodyPr>
         <a:lstStyle/>
         <a:p>
-          <a:pPr marL="0" lvl="0" indent="0" algn="ctr" defTabSz="844550">
+          <a:pPr marL="0" lvl="0" indent="0" algn="ctr" defTabSz="666750">
             <a:lnSpc>
               <a:spcPct val="90000"/>
             </a:lnSpc>
@@ -8834,14 +8939,14 @@
             <a:buNone/>
           </a:pPr>
           <a:r>
-            <a:rPr lang="en-US" sz="1900" kern="1200" dirty="0"/>
+            <a:rPr lang="en-US" sz="1500" kern="1200" dirty="0"/>
             <a:t>+10</a:t>
           </a:r>
         </a:p>
       </dsp:txBody>
       <dsp:txXfrm rot="-5400000">
-        <a:off x="1" y="339270"/>
-        <a:ext cx="675222" cy="289381"/>
+        <a:off x="1" y="284603"/>
+        <a:ext cx="565164" cy="242213"/>
       </dsp:txXfrm>
     </dsp:sp>
     <dsp:sp modelId="{162E096D-52CE-47A1-B91B-5CEA2F187917}">
@@ -8851,8 +8956,8 @@
       </dsp:nvSpPr>
       <dsp:spPr>
         <a:xfrm rot="5400000">
-          <a:off x="5281915" y="-4605033"/>
-          <a:ext cx="626992" cy="9840377"/>
+          <a:off x="5277984" y="-4710798"/>
+          <a:ext cx="524795" cy="9950435"/>
         </a:xfrm>
         <a:prstGeom prst="round2SameRect">
           <a:avLst/>
@@ -8893,12 +8998,12 @@
         <a:fontRef idx="minor"/>
       </dsp:style>
       <dsp:txBody>
-        <a:bodyPr spcFirstLastPara="0" vert="horz" wrap="square" lIns="263144" tIns="23495" rIns="23495" bIns="23495" numCol="1" spcCol="1270" anchor="ctr" anchorCtr="0">
+        <a:bodyPr spcFirstLastPara="0" vert="horz" wrap="square" lIns="220472" tIns="19685" rIns="19685" bIns="19685" numCol="1" spcCol="1270" anchor="ctr" anchorCtr="0">
           <a:noAutofit/>
         </a:bodyPr>
         <a:lstStyle/>
         <a:p>
-          <a:pPr marL="285750" lvl="1" indent="-285750" algn="l" defTabSz="1644650">
+          <a:pPr marL="285750" lvl="1" indent="-285750" algn="l" defTabSz="1377950">
             <a:lnSpc>
               <a:spcPct val="90000"/>
             </a:lnSpc>
@@ -8911,14 +9016,14 @@
             <a:buChar char="•"/>
           </a:pPr>
           <a:r>
-            <a:rPr lang="en-US" sz="3700" kern="1200" dirty="0"/>
+            <a:rPr lang="en-US" sz="3100" kern="1200" dirty="0"/>
             <a:t>First Session</a:t>
           </a:r>
         </a:p>
       </dsp:txBody>
       <dsp:txXfrm rot="-5400000">
-        <a:off x="675223" y="32266"/>
-        <a:ext cx="9809770" cy="565778"/>
+        <a:off x="565164" y="27640"/>
+        <a:ext cx="9924817" cy="473559"/>
       </dsp:txXfrm>
     </dsp:sp>
     <dsp:sp modelId="{61A54C54-172D-4CDD-BC29-B98D8F42DBBB}">
@@ -8928,8 +9033,8 @@
       </dsp:nvSpPr>
       <dsp:spPr>
         <a:xfrm rot="5400000">
-          <a:off x="-144690" y="992203"/>
-          <a:ext cx="964603" cy="675222"/>
+          <a:off x="-121106" y="831111"/>
+          <a:ext cx="807377" cy="565164"/>
         </a:xfrm>
         <a:prstGeom prst="chevron">
           <a:avLst/>
@@ -8971,12 +9076,12 @@
         </a:fontRef>
       </dsp:style>
       <dsp:txBody>
-        <a:bodyPr spcFirstLastPara="0" vert="horz" wrap="square" lIns="12065" tIns="12065" rIns="12065" bIns="12065" numCol="1" spcCol="1270" anchor="ctr" anchorCtr="0">
+        <a:bodyPr spcFirstLastPara="0" vert="horz" wrap="square" lIns="9525" tIns="9525" rIns="9525" bIns="9525" numCol="1" spcCol="1270" anchor="ctr" anchorCtr="0">
           <a:noAutofit/>
         </a:bodyPr>
         <a:lstStyle/>
         <a:p>
-          <a:pPr marL="0" lvl="0" indent="0" algn="ctr" defTabSz="844550">
+          <a:pPr marL="0" lvl="0" indent="0" algn="ctr" defTabSz="666750">
             <a:lnSpc>
               <a:spcPct val="90000"/>
             </a:lnSpc>
@@ -8989,14 +9094,14 @@
             <a:buNone/>
           </a:pPr>
           <a:r>
-            <a:rPr lang="en-US" sz="1900" kern="1200" dirty="0"/>
+            <a:rPr lang="en-US" sz="1500" kern="1200" dirty="0"/>
             <a:t>+10</a:t>
           </a:r>
         </a:p>
       </dsp:txBody>
       <dsp:txXfrm rot="-5400000">
-        <a:off x="1" y="1185123"/>
-        <a:ext cx="675222" cy="289381"/>
+        <a:off x="1" y="992586"/>
+        <a:ext cx="565164" cy="242213"/>
       </dsp:txXfrm>
     </dsp:sp>
     <dsp:sp modelId="{3A37B327-F866-4826-98CA-0A915B9DACF2}">
@@ -9006,8 +9111,8 @@
       </dsp:nvSpPr>
       <dsp:spPr>
         <a:xfrm rot="5400000">
-          <a:off x="5281915" y="-3759179"/>
-          <a:ext cx="626992" cy="9840377"/>
+          <a:off x="5277984" y="-4002815"/>
+          <a:ext cx="524795" cy="9950435"/>
         </a:xfrm>
         <a:prstGeom prst="round2SameRect">
           <a:avLst/>
@@ -9048,12 +9153,12 @@
         <a:fontRef idx="minor"/>
       </dsp:style>
       <dsp:txBody>
-        <a:bodyPr spcFirstLastPara="0" vert="horz" wrap="square" lIns="263144" tIns="23495" rIns="23495" bIns="23495" numCol="1" spcCol="1270" anchor="ctr" anchorCtr="0">
+        <a:bodyPr spcFirstLastPara="0" vert="horz" wrap="square" lIns="220472" tIns="19685" rIns="19685" bIns="19685" numCol="1" spcCol="1270" anchor="ctr" anchorCtr="0">
           <a:noAutofit/>
         </a:bodyPr>
         <a:lstStyle/>
         <a:p>
-          <a:pPr marL="285750" lvl="1" indent="-285750" algn="l" defTabSz="1644650">
+          <a:pPr marL="285750" lvl="1" indent="-285750" algn="l" defTabSz="1377950">
             <a:lnSpc>
               <a:spcPct val="90000"/>
             </a:lnSpc>
@@ -9066,14 +9171,14 @@
             <a:buChar char="•"/>
           </a:pPr>
           <a:r>
-            <a:rPr lang="en-US" sz="3700" kern="1200" dirty="0"/>
+            <a:rPr lang="en-US" sz="3100" kern="1200" dirty="0"/>
             <a:t>Second Session</a:t>
           </a:r>
         </a:p>
       </dsp:txBody>
       <dsp:txXfrm rot="-5400000">
-        <a:off x="675223" y="878120"/>
-        <a:ext cx="9809770" cy="565778"/>
+        <a:off x="565164" y="735623"/>
+        <a:ext cx="9924817" cy="473559"/>
       </dsp:txXfrm>
     </dsp:sp>
     <dsp:sp modelId="{0F7B292B-11B2-4106-9D6D-DD080EA48D5B}">
@@ -9083,8 +9188,8 @@
       </dsp:nvSpPr>
       <dsp:spPr>
         <a:xfrm rot="5400000">
-          <a:off x="-144690" y="1838057"/>
-          <a:ext cx="964603" cy="675222"/>
+          <a:off x="-121106" y="1539095"/>
+          <a:ext cx="807377" cy="565164"/>
         </a:xfrm>
         <a:prstGeom prst="chevron">
           <a:avLst/>
@@ -9126,12 +9231,12 @@
         </a:fontRef>
       </dsp:style>
       <dsp:txBody>
-        <a:bodyPr spcFirstLastPara="0" vert="horz" wrap="square" lIns="12065" tIns="12065" rIns="12065" bIns="12065" numCol="1" spcCol="1270" anchor="ctr" anchorCtr="0">
+        <a:bodyPr spcFirstLastPara="0" vert="horz" wrap="square" lIns="9525" tIns="9525" rIns="9525" bIns="9525" numCol="1" spcCol="1270" anchor="ctr" anchorCtr="0">
           <a:noAutofit/>
         </a:bodyPr>
         <a:lstStyle/>
         <a:p>
-          <a:pPr marL="0" lvl="0" indent="0" algn="ctr" defTabSz="844550">
+          <a:pPr marL="0" lvl="0" indent="0" algn="ctr" defTabSz="666750">
             <a:lnSpc>
               <a:spcPct val="90000"/>
             </a:lnSpc>
@@ -9144,14 +9249,14 @@
             <a:buNone/>
           </a:pPr>
           <a:r>
-            <a:rPr lang="en-US" sz="1900" kern="1200" dirty="0"/>
+            <a:rPr lang="en-US" sz="1500" kern="1200" dirty="0"/>
             <a:t>+15</a:t>
           </a:r>
         </a:p>
       </dsp:txBody>
       <dsp:txXfrm rot="-5400000">
-        <a:off x="1" y="2030977"/>
-        <a:ext cx="675222" cy="289381"/>
+        <a:off x="1" y="1700570"/>
+        <a:ext cx="565164" cy="242213"/>
       </dsp:txXfrm>
     </dsp:sp>
     <dsp:sp modelId="{3B67A9E2-DFF8-4E7F-9AFA-6BBA20580329}">
@@ -9161,8 +9266,8 @@
       </dsp:nvSpPr>
       <dsp:spPr>
         <a:xfrm rot="5400000">
-          <a:off x="5281915" y="-2913325"/>
-          <a:ext cx="626992" cy="9840377"/>
+          <a:off x="5277984" y="-3294831"/>
+          <a:ext cx="524795" cy="9950435"/>
         </a:xfrm>
         <a:prstGeom prst="round2SameRect">
           <a:avLst/>
@@ -9203,12 +9308,12 @@
         <a:fontRef idx="minor"/>
       </dsp:style>
       <dsp:txBody>
-        <a:bodyPr spcFirstLastPara="0" vert="horz" wrap="square" lIns="263144" tIns="23495" rIns="23495" bIns="23495" numCol="1" spcCol="1270" anchor="ctr" anchorCtr="0">
+        <a:bodyPr spcFirstLastPara="0" vert="horz" wrap="square" lIns="220472" tIns="19685" rIns="19685" bIns="19685" numCol="1" spcCol="1270" anchor="ctr" anchorCtr="0">
           <a:noAutofit/>
         </a:bodyPr>
         <a:lstStyle/>
         <a:p>
-          <a:pPr marL="285750" lvl="1" indent="-285750" algn="l" defTabSz="1644650">
+          <a:pPr marL="285750" lvl="1" indent="-285750" algn="l" defTabSz="1377950">
             <a:lnSpc>
               <a:spcPct val="90000"/>
             </a:lnSpc>
@@ -9221,25 +9326,25 @@
             <a:buChar char="•"/>
           </a:pPr>
           <a:r>
-            <a:rPr lang="en-US" sz="3700" kern="1200" dirty="0"/>
+            <a:rPr lang="en-US" sz="3100" kern="1200" dirty="0"/>
             <a:t>Third Session</a:t>
           </a:r>
         </a:p>
       </dsp:txBody>
       <dsp:txXfrm rot="-5400000">
-        <a:off x="675223" y="1723974"/>
-        <a:ext cx="9809770" cy="565778"/>
+        <a:off x="565164" y="1443607"/>
+        <a:ext cx="9924817" cy="473559"/>
       </dsp:txXfrm>
     </dsp:sp>
-    <dsp:sp modelId="{B3BF44CF-19CD-479A-834F-9A8FE8BE3231}">
+    <dsp:sp modelId="{5242CE44-08F7-47DF-9DC7-6830D97AF155}">
       <dsp:nvSpPr>
         <dsp:cNvPr id="0" name=""/>
         <dsp:cNvSpPr/>
       </dsp:nvSpPr>
       <dsp:spPr>
         <a:xfrm rot="5400000">
-          <a:off x="-144690" y="2683911"/>
-          <a:ext cx="964603" cy="675222"/>
+          <a:off x="-121106" y="2247078"/>
+          <a:ext cx="807377" cy="565164"/>
         </a:xfrm>
         <a:prstGeom prst="chevron">
           <a:avLst/>
@@ -9281,12 +9386,12 @@
         </a:fontRef>
       </dsp:style>
       <dsp:txBody>
-        <a:bodyPr spcFirstLastPara="0" vert="horz" wrap="square" lIns="12065" tIns="12065" rIns="12065" bIns="12065" numCol="1" spcCol="1270" anchor="ctr" anchorCtr="0">
+        <a:bodyPr spcFirstLastPara="0" vert="horz" wrap="square" lIns="9525" tIns="9525" rIns="9525" bIns="9525" numCol="1" spcCol="1270" anchor="ctr" anchorCtr="0">
           <a:noAutofit/>
         </a:bodyPr>
         <a:lstStyle/>
         <a:p>
-          <a:pPr marL="0" lvl="0" indent="0" algn="ctr" defTabSz="844550">
+          <a:pPr marL="0" lvl="0" indent="0" algn="ctr" defTabSz="666750">
             <a:lnSpc>
               <a:spcPct val="90000"/>
             </a:lnSpc>
@@ -9299,25 +9404,25 @@
             <a:buNone/>
           </a:pPr>
           <a:r>
-            <a:rPr lang="en-US" sz="1900" kern="1200" dirty="0"/>
-            <a:t>+10</a:t>
+            <a:rPr lang="en-US" sz="1500" kern="1200" dirty="0"/>
+            <a:t>+20</a:t>
           </a:r>
         </a:p>
       </dsp:txBody>
       <dsp:txXfrm rot="-5400000">
-        <a:off x="1" y="2876831"/>
-        <a:ext cx="675222" cy="289381"/>
+        <a:off x="1" y="2408553"/>
+        <a:ext cx="565164" cy="242213"/>
       </dsp:txXfrm>
     </dsp:sp>
-    <dsp:sp modelId="{6443F1A0-166F-49CC-88CC-0A56B84EFEA4}">
+    <dsp:sp modelId="{BCB1B1A9-05C0-4069-B1B2-CB760D54E3BC}">
       <dsp:nvSpPr>
         <dsp:cNvPr id="0" name=""/>
         <dsp:cNvSpPr/>
       </dsp:nvSpPr>
       <dsp:spPr>
         <a:xfrm rot="5400000">
-          <a:off x="5281915" y="-2067471"/>
-          <a:ext cx="626992" cy="9840377"/>
+          <a:off x="5277984" y="-2586848"/>
+          <a:ext cx="524795" cy="9950435"/>
         </a:xfrm>
         <a:prstGeom prst="round2SameRect">
           <a:avLst/>
@@ -9358,12 +9463,12 @@
         <a:fontRef idx="minor"/>
       </dsp:style>
       <dsp:txBody>
-        <a:bodyPr spcFirstLastPara="0" vert="horz" wrap="square" lIns="263144" tIns="23495" rIns="23495" bIns="23495" numCol="1" spcCol="1270" anchor="ctr" anchorCtr="0">
+        <a:bodyPr spcFirstLastPara="0" vert="horz" wrap="square" lIns="220472" tIns="19685" rIns="19685" bIns="19685" numCol="1" spcCol="1270" anchor="ctr" anchorCtr="0">
           <a:noAutofit/>
         </a:bodyPr>
         <a:lstStyle/>
         <a:p>
-          <a:pPr marL="285750" lvl="1" indent="-285750" algn="l" defTabSz="1644650">
+          <a:pPr marL="285750" lvl="1" indent="-285750" algn="l" defTabSz="1377950">
             <a:lnSpc>
               <a:spcPct val="90000"/>
             </a:lnSpc>
@@ -9376,25 +9481,25 @@
             <a:buChar char="•"/>
           </a:pPr>
           <a:r>
-            <a:rPr lang="en-US" sz="3700" kern="1200" dirty="0"/>
-            <a:t>Performance: Best earners</a:t>
+            <a:rPr lang="en-US" sz="3100" kern="1200" dirty="0"/>
+            <a:t>Fourth</a:t>
           </a:r>
         </a:p>
       </dsp:txBody>
       <dsp:txXfrm rot="-5400000">
-        <a:off x="675223" y="2569828"/>
-        <a:ext cx="9809770" cy="565778"/>
+        <a:off x="565164" y="2151590"/>
+        <a:ext cx="9924817" cy="473559"/>
       </dsp:txXfrm>
     </dsp:sp>
-    <dsp:sp modelId="{199B0682-B030-4CF0-AFCF-1960E2C41ECD}">
+    <dsp:sp modelId="{B3BF44CF-19CD-479A-834F-9A8FE8BE3231}">
       <dsp:nvSpPr>
         <dsp:cNvPr id="0" name=""/>
         <dsp:cNvSpPr/>
       </dsp:nvSpPr>
       <dsp:spPr>
         <a:xfrm rot="5400000">
-          <a:off x="-144690" y="3529765"/>
-          <a:ext cx="964603" cy="675222"/>
+          <a:off x="-121106" y="2955062"/>
+          <a:ext cx="807377" cy="565164"/>
         </a:xfrm>
         <a:prstGeom prst="chevron">
           <a:avLst/>
@@ -9436,12 +9541,12 @@
         </a:fontRef>
       </dsp:style>
       <dsp:txBody>
-        <a:bodyPr spcFirstLastPara="0" vert="horz" wrap="square" lIns="12065" tIns="12065" rIns="12065" bIns="12065" numCol="1" spcCol="1270" anchor="ctr" anchorCtr="0">
+        <a:bodyPr spcFirstLastPara="0" vert="horz" wrap="square" lIns="9525" tIns="9525" rIns="9525" bIns="9525" numCol="1" spcCol="1270" anchor="ctr" anchorCtr="0">
           <a:noAutofit/>
         </a:bodyPr>
         <a:lstStyle/>
         <a:p>
-          <a:pPr marL="0" lvl="0" indent="0" algn="ctr" defTabSz="844550">
+          <a:pPr marL="0" lvl="0" indent="0" algn="ctr" defTabSz="666750">
             <a:lnSpc>
               <a:spcPct val="90000"/>
             </a:lnSpc>
@@ -9454,25 +9559,25 @@
             <a:buNone/>
           </a:pPr>
           <a:r>
-            <a:rPr lang="en-US" sz="1900" kern="1200" dirty="0"/>
-            <a:t>+50</a:t>
+            <a:rPr lang="en-US" sz="1500" kern="1200" dirty="0"/>
+            <a:t>+40</a:t>
           </a:r>
         </a:p>
       </dsp:txBody>
       <dsp:txXfrm rot="-5400000">
-        <a:off x="1" y="3722685"/>
-        <a:ext cx="675222" cy="289381"/>
+        <a:off x="1" y="3116537"/>
+        <a:ext cx="565164" cy="242213"/>
       </dsp:txXfrm>
     </dsp:sp>
-    <dsp:sp modelId="{156F03FE-ABAA-4736-B27F-696CC0E5EC5F}">
+    <dsp:sp modelId="{6443F1A0-166F-49CC-88CC-0A56B84EFEA4}">
       <dsp:nvSpPr>
         <dsp:cNvPr id="0" name=""/>
         <dsp:cNvSpPr/>
       </dsp:nvSpPr>
       <dsp:spPr>
         <a:xfrm rot="5400000">
-          <a:off x="5281915" y="-1221617"/>
-          <a:ext cx="626992" cy="9840377"/>
+          <a:off x="5277984" y="-1878864"/>
+          <a:ext cx="524795" cy="9950435"/>
         </a:xfrm>
         <a:prstGeom prst="round2SameRect">
           <a:avLst/>
@@ -9513,12 +9618,12 @@
         <a:fontRef idx="minor"/>
       </dsp:style>
       <dsp:txBody>
-        <a:bodyPr spcFirstLastPara="0" vert="horz" wrap="square" lIns="263144" tIns="23495" rIns="23495" bIns="23495" numCol="1" spcCol="1270" anchor="ctr" anchorCtr="0">
+        <a:bodyPr spcFirstLastPara="0" vert="horz" wrap="square" lIns="220472" tIns="19685" rIns="19685" bIns="19685" numCol="1" spcCol="1270" anchor="ctr" anchorCtr="0">
           <a:noAutofit/>
         </a:bodyPr>
         <a:lstStyle/>
         <a:p>
-          <a:pPr marL="285750" lvl="1" indent="-285750" algn="l" defTabSz="1644650">
+          <a:pPr marL="285750" lvl="1" indent="-285750" algn="l" defTabSz="1377950">
             <a:lnSpc>
               <a:spcPct val="90000"/>
             </a:lnSpc>
@@ -9531,14 +9636,169 @@
             <a:buChar char="•"/>
           </a:pPr>
           <a:r>
-            <a:rPr lang="en-US" sz="3700" kern="1200" dirty="0"/>
+            <a:rPr lang="en-US" sz="3100" kern="1200" dirty="0"/>
+            <a:t>Leaderboard: $10 for first place and $5 for second place</a:t>
+          </a:r>
+        </a:p>
+      </dsp:txBody>
+      <dsp:txXfrm rot="-5400000">
+        <a:off x="565164" y="2859574"/>
+        <a:ext cx="9924817" cy="473559"/>
+      </dsp:txXfrm>
+    </dsp:sp>
+    <dsp:sp modelId="{199B0682-B030-4CF0-AFCF-1960E2C41ECD}">
+      <dsp:nvSpPr>
+        <dsp:cNvPr id="0" name=""/>
+        <dsp:cNvSpPr/>
+      </dsp:nvSpPr>
+      <dsp:spPr>
+        <a:xfrm rot="5400000">
+          <a:off x="-121106" y="3663045"/>
+          <a:ext cx="807377" cy="565164"/>
+        </a:xfrm>
+        <a:prstGeom prst="chevron">
+          <a:avLst/>
+        </a:prstGeom>
+        <a:solidFill>
+          <a:schemeClr val="accent1">
+            <a:hueOff val="0"/>
+            <a:satOff val="0"/>
+            <a:lumOff val="0"/>
+            <a:alphaOff val="0"/>
+          </a:schemeClr>
+        </a:solidFill>
+        <a:ln w="12700" cap="flat" cmpd="sng" algn="ctr">
+          <a:solidFill>
+            <a:schemeClr val="accent1">
+              <a:hueOff val="0"/>
+              <a:satOff val="0"/>
+              <a:lumOff val="0"/>
+              <a:alphaOff val="0"/>
+            </a:schemeClr>
+          </a:solidFill>
+          <a:prstDash val="solid"/>
+          <a:miter lim="800000"/>
+        </a:ln>
+        <a:effectLst/>
+      </dsp:spPr>
+      <dsp:style>
+        <a:lnRef idx="2">
+          <a:scrgbClr r="0" g="0" b="0"/>
+        </a:lnRef>
+        <a:fillRef idx="1">
+          <a:scrgbClr r="0" g="0" b="0"/>
+        </a:fillRef>
+        <a:effectRef idx="0">
+          <a:scrgbClr r="0" g="0" b="0"/>
+        </a:effectRef>
+        <a:fontRef idx="minor">
+          <a:schemeClr val="lt1"/>
+        </a:fontRef>
+      </dsp:style>
+      <dsp:txBody>
+        <a:bodyPr spcFirstLastPara="0" vert="horz" wrap="square" lIns="9525" tIns="9525" rIns="9525" bIns="9525" numCol="1" spcCol="1270" anchor="ctr" anchorCtr="0">
+          <a:noAutofit/>
+        </a:bodyPr>
+        <a:lstStyle/>
+        <a:p>
+          <a:pPr marL="0" lvl="0" indent="0" algn="ctr" defTabSz="666750">
+            <a:lnSpc>
+              <a:spcPct val="90000"/>
+            </a:lnSpc>
+            <a:spcBef>
+              <a:spcPct val="0"/>
+            </a:spcBef>
+            <a:spcAft>
+              <a:spcPct val="35000"/>
+            </a:spcAft>
+            <a:buNone/>
+          </a:pPr>
+          <a:r>
+            <a:rPr lang="en-US" sz="1500" kern="1200" dirty="0"/>
+            <a:t>+50</a:t>
+          </a:r>
+        </a:p>
+      </dsp:txBody>
+      <dsp:txXfrm rot="-5400000">
+        <a:off x="1" y="3824520"/>
+        <a:ext cx="565164" cy="242213"/>
+      </dsp:txXfrm>
+    </dsp:sp>
+    <dsp:sp modelId="{156F03FE-ABAA-4736-B27F-696CC0E5EC5F}">
+      <dsp:nvSpPr>
+        <dsp:cNvPr id="0" name=""/>
+        <dsp:cNvSpPr/>
+      </dsp:nvSpPr>
+      <dsp:spPr>
+        <a:xfrm rot="5400000">
+          <a:off x="5277984" y="-1170881"/>
+          <a:ext cx="524795" cy="9950435"/>
+        </a:xfrm>
+        <a:prstGeom prst="round2SameRect">
+          <a:avLst/>
+        </a:prstGeom>
+        <a:solidFill>
+          <a:schemeClr val="lt1">
+            <a:alpha val="90000"/>
+            <a:hueOff val="0"/>
+            <a:satOff val="0"/>
+            <a:lumOff val="0"/>
+            <a:alphaOff val="0"/>
+          </a:schemeClr>
+        </a:solidFill>
+        <a:ln w="12700" cap="flat" cmpd="sng" algn="ctr">
+          <a:solidFill>
+            <a:schemeClr val="accent1">
+              <a:hueOff val="0"/>
+              <a:satOff val="0"/>
+              <a:lumOff val="0"/>
+              <a:alphaOff val="0"/>
+            </a:schemeClr>
+          </a:solidFill>
+          <a:prstDash val="solid"/>
+          <a:miter lim="800000"/>
+        </a:ln>
+        <a:effectLst/>
+      </dsp:spPr>
+      <dsp:style>
+        <a:lnRef idx="2">
+          <a:scrgbClr r="0" g="0" b="0"/>
+        </a:lnRef>
+        <a:fillRef idx="1">
+          <a:scrgbClr r="0" g="0" b="0"/>
+        </a:fillRef>
+        <a:effectRef idx="0">
+          <a:scrgbClr r="0" g="0" b="0"/>
+        </a:effectRef>
+        <a:fontRef idx="minor"/>
+      </dsp:style>
+      <dsp:txBody>
+        <a:bodyPr spcFirstLastPara="0" vert="horz" wrap="square" lIns="220472" tIns="19685" rIns="19685" bIns="19685" numCol="1" spcCol="1270" anchor="ctr" anchorCtr="0">
+          <a:noAutofit/>
+        </a:bodyPr>
+        <a:lstStyle/>
+        <a:p>
+          <a:pPr marL="285750" lvl="1" indent="-285750" algn="l" defTabSz="1377950">
+            <a:lnSpc>
+              <a:spcPct val="90000"/>
+            </a:lnSpc>
+            <a:spcBef>
+              <a:spcPct val="0"/>
+            </a:spcBef>
+            <a:spcAft>
+              <a:spcPct val="15000"/>
+            </a:spcAft>
+            <a:buChar char="•"/>
+          </a:pPr>
+          <a:r>
+            <a:rPr lang="en-US" sz="3100" kern="1200" dirty="0"/>
             <a:t>Chance: Raffle x7 – each session is an entry</a:t>
           </a:r>
         </a:p>
       </dsp:txBody>
       <dsp:txXfrm rot="-5400000">
-        <a:off x="675223" y="3415682"/>
-        <a:ext cx="9809770" cy="565778"/>
+        <a:off x="565164" y="3567557"/>
+        <a:ext cx="9924817" cy="473559"/>
       </dsp:txXfrm>
     </dsp:sp>
   </dsp:spTree>
@@ -30174,7 +30434,7 @@
         <p:spPr>
           <a:xfrm>
             <a:off x="53920" y="890005"/>
-            <a:ext cx="12084160" cy="5941483"/>
+            <a:ext cx="12084159" cy="5941483"/>
           </a:xfrm>
           <a:prstGeom prst="rect">
             <a:avLst/>
@@ -30183,6 +30443,60 @@
       </p:pic>
       <p:sp>
         <p:nvSpPr>
+          <p:cNvPr id="7" name="Rectangle 6">
+            <a:extLst>
+              <a:ext uri="{FF2B5EF4-FFF2-40B4-BE49-F238E27FC236}">
+                <a16:creationId xmlns:a16="http://schemas.microsoft.com/office/drawing/2014/main" id="{CBF6E5CD-BCA6-40A8-9838-18FFEAA2A68F}"/>
+              </a:ext>
+            </a:extLst>
+          </p:cNvPr>
+          <p:cNvSpPr/>
+          <p:nvPr/>
+        </p:nvSpPr>
+        <p:spPr>
+          <a:xfrm>
+            <a:off x="0" y="4680761"/>
+            <a:ext cx="12192000" cy="563947"/>
+          </a:xfrm>
+          <a:prstGeom prst="rect">
+            <a:avLst/>
+          </a:prstGeom>
+          <a:solidFill>
+            <a:schemeClr val="bg1"/>
+          </a:solidFill>
+          <a:ln>
+            <a:solidFill>
+              <a:schemeClr val="bg1"/>
+            </a:solidFill>
+          </a:ln>
+        </p:spPr>
+        <p:style>
+          <a:lnRef idx="2">
+            <a:schemeClr val="accent1">
+              <a:shade val="50000"/>
+            </a:schemeClr>
+          </a:lnRef>
+          <a:fillRef idx="1">
+            <a:schemeClr val="accent1"/>
+          </a:fillRef>
+          <a:effectRef idx="0">
+            <a:schemeClr val="accent1"/>
+          </a:effectRef>
+          <a:fontRef idx="minor">
+            <a:schemeClr val="lt1"/>
+          </a:fontRef>
+        </p:style>
+        <p:txBody>
+          <a:bodyPr rtlCol="0" anchor="ctr"/>
+          <a:lstStyle/>
+          <a:p>
+            <a:pPr algn="ctr"/>
+            <a:endParaRPr lang="en-US"/>
+          </a:p>
+        </p:txBody>
+      </p:sp>
+      <p:sp>
+        <p:nvSpPr>
           <p:cNvPr id="6" name="Rectangle: Rounded Corners 5">
             <a:extLst>
               <a:ext uri="{FF2B5EF4-FFF2-40B4-BE49-F238E27FC236}">
@@ -30196,7 +30510,7 @@
         <p:spPr>
           <a:xfrm>
             <a:off x="44068" y="3183874"/>
-            <a:ext cx="12052452" cy="2208883"/>
+            <a:ext cx="12052452" cy="1653987"/>
           </a:xfrm>
           <a:prstGeom prst="roundRect">
             <a:avLst/>
@@ -30335,8 +30649,8 @@
         </p:blipFill>
         <p:spPr>
           <a:xfrm>
-            <a:off x="53920" y="890005"/>
-            <a:ext cx="12084159" cy="5941482"/>
+            <a:off x="53921" y="890005"/>
+            <a:ext cx="12084157" cy="5941482"/>
           </a:xfrm>
           <a:prstGeom prst="rect">
             <a:avLst/>
@@ -30357,7 +30671,7 @@
         </p:nvSpPr>
         <p:spPr>
           <a:xfrm>
-            <a:off x="2853369" y="4142343"/>
+            <a:off x="2853369" y="4098035"/>
             <a:ext cx="4941066" cy="352540"/>
           </a:xfrm>
           <a:prstGeom prst="roundRect">
@@ -30378,6 +30692,60 @@
           </a:effectRef>
           <a:fontRef idx="minor">
             <a:schemeClr val="dk1"/>
+          </a:fontRef>
+        </p:style>
+        <p:txBody>
+          <a:bodyPr rtlCol="0" anchor="ctr"/>
+          <a:lstStyle/>
+          <a:p>
+            <a:pPr algn="ctr"/>
+            <a:endParaRPr lang="en-US"/>
+          </a:p>
+        </p:txBody>
+      </p:sp>
+      <p:sp>
+        <p:nvSpPr>
+          <p:cNvPr id="7" name="Rectangle 6">
+            <a:extLst>
+              <a:ext uri="{FF2B5EF4-FFF2-40B4-BE49-F238E27FC236}">
+                <a16:creationId xmlns:a16="http://schemas.microsoft.com/office/drawing/2014/main" id="{1C1FDA93-4E33-4597-93F4-7B0AAB8A8484}"/>
+              </a:ext>
+            </a:extLst>
+          </p:cNvPr>
+          <p:cNvSpPr/>
+          <p:nvPr/>
+        </p:nvSpPr>
+        <p:spPr>
+          <a:xfrm>
+            <a:off x="0" y="4680761"/>
+            <a:ext cx="12192000" cy="563947"/>
+          </a:xfrm>
+          <a:prstGeom prst="rect">
+            <a:avLst/>
+          </a:prstGeom>
+          <a:solidFill>
+            <a:schemeClr val="bg1"/>
+          </a:solidFill>
+          <a:ln>
+            <a:solidFill>
+              <a:schemeClr val="bg1"/>
+            </a:solidFill>
+          </a:ln>
+        </p:spPr>
+        <p:style>
+          <a:lnRef idx="2">
+            <a:schemeClr val="accent1">
+              <a:shade val="50000"/>
+            </a:schemeClr>
+          </a:lnRef>
+          <a:fillRef idx="1">
+            <a:schemeClr val="accent1"/>
+          </a:fillRef>
+          <a:effectRef idx="0">
+            <a:schemeClr val="accent1"/>
+          </a:effectRef>
+          <a:fontRef idx="minor">
+            <a:schemeClr val="lt1"/>
           </a:fontRef>
         </p:style>
         <p:txBody>
@@ -32464,8 +32832,8 @@
         </p:blipFill>
         <p:spPr>
           <a:xfrm>
-            <a:off x="53920" y="890005"/>
-            <a:ext cx="12084159" cy="5941482"/>
+            <a:off x="53921" y="890005"/>
+            <a:ext cx="12084157" cy="5941482"/>
           </a:xfrm>
           <a:prstGeom prst="rect">
             <a:avLst/>
@@ -32486,7 +32854,7 @@
         </p:nvSpPr>
         <p:spPr>
           <a:xfrm>
-            <a:off x="0" y="3831990"/>
+            <a:off x="96677" y="3751426"/>
             <a:ext cx="1702420" cy="848771"/>
           </a:xfrm>
           <a:prstGeom prst="roundRect">
@@ -32520,10 +32888,10 @@
       </p:sp>
       <p:sp>
         <p:nvSpPr>
-          <p:cNvPr id="7" name="Rectangle: Rounded Corners 6">
-            <a:extLst>
-              <a:ext uri="{FF2B5EF4-FFF2-40B4-BE49-F238E27FC236}">
-                <a16:creationId xmlns:a16="http://schemas.microsoft.com/office/drawing/2014/main" id="{3F58E3BF-6DF7-4AEE-A81B-B8FAD8C313D6}"/>
+          <p:cNvPr id="8" name="Rectangle 7">
+            <a:extLst>
+              <a:ext uri="{FF2B5EF4-FFF2-40B4-BE49-F238E27FC236}">
+                <a16:creationId xmlns:a16="http://schemas.microsoft.com/office/drawing/2014/main" id="{9E3E78FF-FBD6-4634-8A55-D682849AA0BB}"/>
               </a:ext>
             </a:extLst>
           </p:cNvPr>
@@ -32532,7 +32900,61 @@
         </p:nvSpPr>
         <p:spPr>
           <a:xfrm>
-            <a:off x="3466326" y="3731494"/>
+            <a:off x="0" y="4680761"/>
+            <a:ext cx="12192000" cy="563947"/>
+          </a:xfrm>
+          <a:prstGeom prst="rect">
+            <a:avLst/>
+          </a:prstGeom>
+          <a:solidFill>
+            <a:schemeClr val="bg1"/>
+          </a:solidFill>
+          <a:ln>
+            <a:solidFill>
+              <a:schemeClr val="bg1"/>
+            </a:solidFill>
+          </a:ln>
+        </p:spPr>
+        <p:style>
+          <a:lnRef idx="2">
+            <a:schemeClr val="accent1">
+              <a:shade val="50000"/>
+            </a:schemeClr>
+          </a:lnRef>
+          <a:fillRef idx="1">
+            <a:schemeClr val="accent1"/>
+          </a:fillRef>
+          <a:effectRef idx="0">
+            <a:schemeClr val="accent1"/>
+          </a:effectRef>
+          <a:fontRef idx="minor">
+            <a:schemeClr val="lt1"/>
+          </a:fontRef>
+        </p:style>
+        <p:txBody>
+          <a:bodyPr rtlCol="0" anchor="ctr"/>
+          <a:lstStyle/>
+          <a:p>
+            <a:pPr algn="ctr"/>
+            <a:endParaRPr lang="en-US"/>
+          </a:p>
+        </p:txBody>
+      </p:sp>
+      <p:sp>
+        <p:nvSpPr>
+          <p:cNvPr id="7" name="Rectangle: Rounded Corners 6">
+            <a:extLst>
+              <a:ext uri="{FF2B5EF4-FFF2-40B4-BE49-F238E27FC236}">
+                <a16:creationId xmlns:a16="http://schemas.microsoft.com/office/drawing/2014/main" id="{3F58E3BF-6DF7-4AEE-A81B-B8FAD8C313D6}"/>
+              </a:ext>
+            </a:extLst>
+          </p:cNvPr>
+          <p:cNvSpPr/>
+          <p:nvPr/>
+        </p:nvSpPr>
+        <p:spPr>
+          <a:xfrm>
+            <a:off x="3011140" y="3751635"/>
             <a:ext cx="1744291" cy="1013718"/>
           </a:xfrm>
           <a:prstGeom prst="roundRect">
@@ -32672,8 +33094,8 @@
         </p:blipFill>
         <p:spPr>
           <a:xfrm>
-            <a:off x="53920" y="890005"/>
-            <a:ext cx="12084159" cy="5941482"/>
+            <a:off x="53921" y="890005"/>
+            <a:ext cx="12084157" cy="5941482"/>
           </a:xfrm>
           <a:prstGeom prst="rect">
             <a:avLst/>
@@ -32694,7 +33116,7 @@
         </p:nvSpPr>
         <p:spPr>
           <a:xfrm>
-            <a:off x="72506" y="3831990"/>
+            <a:off x="72506" y="3791710"/>
             <a:ext cx="1629913" cy="349275"/>
           </a:xfrm>
           <a:prstGeom prst="roundRect">
@@ -32715,6 +33137,60 @@
           </a:effectRef>
           <a:fontRef idx="minor">
             <a:schemeClr val="dk1"/>
+          </a:fontRef>
+        </p:style>
+        <p:txBody>
+          <a:bodyPr rtlCol="0" anchor="ctr"/>
+          <a:lstStyle/>
+          <a:p>
+            <a:pPr algn="ctr"/>
+            <a:endParaRPr lang="en-US"/>
+          </a:p>
+        </p:txBody>
+      </p:sp>
+      <p:sp>
+        <p:nvSpPr>
+          <p:cNvPr id="7" name="Rectangle 6">
+            <a:extLst>
+              <a:ext uri="{FF2B5EF4-FFF2-40B4-BE49-F238E27FC236}">
+                <a16:creationId xmlns:a16="http://schemas.microsoft.com/office/drawing/2014/main" id="{FBFD47C8-3511-4F04-A7E1-F20F09948748}"/>
+              </a:ext>
+            </a:extLst>
+          </p:cNvPr>
+          <p:cNvSpPr/>
+          <p:nvPr/>
+        </p:nvSpPr>
+        <p:spPr>
+          <a:xfrm>
+            <a:off x="0" y="4680761"/>
+            <a:ext cx="12192000" cy="563947"/>
+          </a:xfrm>
+          <a:prstGeom prst="rect">
+            <a:avLst/>
+          </a:prstGeom>
+          <a:solidFill>
+            <a:schemeClr val="bg1"/>
+          </a:solidFill>
+          <a:ln>
+            <a:solidFill>
+              <a:schemeClr val="bg1"/>
+            </a:solidFill>
+          </a:ln>
+        </p:spPr>
+        <p:style>
+          <a:lnRef idx="2">
+            <a:schemeClr val="accent1">
+              <a:shade val="50000"/>
+            </a:schemeClr>
+          </a:lnRef>
+          <a:fillRef idx="1">
+            <a:schemeClr val="accent1"/>
+          </a:fillRef>
+          <a:effectRef idx="0">
+            <a:schemeClr val="accent1"/>
+          </a:effectRef>
+          <a:fontRef idx="minor">
+            <a:schemeClr val="lt1"/>
           </a:fontRef>
         </p:style>
         <p:txBody>
@@ -32996,8 +33472,8 @@
         </p:blipFill>
         <p:spPr>
           <a:xfrm>
-            <a:off x="53921" y="890005"/>
-            <a:ext cx="12084157" cy="5941481"/>
+            <a:off x="53922" y="890005"/>
+            <a:ext cx="12084155" cy="5941481"/>
           </a:xfrm>
           <a:prstGeom prst="rect">
             <a:avLst/>
@@ -33006,10 +33482,57 @@
       </p:pic>
       <p:sp>
         <p:nvSpPr>
-          <p:cNvPr id="6" name="Rectangle: Rounded Corners 5">
-            <a:extLst>
-              <a:ext uri="{FF2B5EF4-FFF2-40B4-BE49-F238E27FC236}">
-                <a16:creationId xmlns:a16="http://schemas.microsoft.com/office/drawing/2014/main" id="{DBCCBCA9-A392-42E4-9F0C-A3CFC215C8EF}"/>
+          <p:cNvPr id="5" name="Arrow: Left 4">
+            <a:extLst>
+              <a:ext uri="{FF2B5EF4-FFF2-40B4-BE49-F238E27FC236}">
+                <a16:creationId xmlns:a16="http://schemas.microsoft.com/office/drawing/2014/main" id="{40BCAAE6-3D1C-4384-866B-9883EA640F1F}"/>
+              </a:ext>
+            </a:extLst>
+          </p:cNvPr>
+          <p:cNvSpPr/>
+          <p:nvPr/>
+        </p:nvSpPr>
+        <p:spPr>
+          <a:xfrm rot="21209117">
+            <a:off x="1123866" y="4414905"/>
+            <a:ext cx="914400" cy="487411"/>
+          </a:xfrm>
+          <a:prstGeom prst="leftArrow">
+            <a:avLst/>
+          </a:prstGeom>
+        </p:spPr>
+        <p:style>
+          <a:lnRef idx="1">
+            <a:schemeClr val="accent2"/>
+          </a:lnRef>
+          <a:fillRef idx="2">
+            <a:schemeClr val="accent2"/>
+          </a:fillRef>
+          <a:effectRef idx="1">
+            <a:schemeClr val="accent2"/>
+          </a:effectRef>
+          <a:fontRef idx="minor">
+            <a:schemeClr val="dk1"/>
+          </a:fontRef>
+        </p:style>
+        <p:txBody>
+          <a:bodyPr rtlCol="0" anchor="ctr"/>
+          <a:lstStyle/>
+          <a:p>
+            <a:pPr algn="ctr"/>
+            <a:r>
+              <a:rPr lang="en-US" dirty="0"/>
+              <a:t>you</a:t>
+            </a:r>
+          </a:p>
+        </p:txBody>
+      </p:sp>
+      <p:sp>
+        <p:nvSpPr>
+          <p:cNvPr id="7" name="Rectangle 6">
+            <a:extLst>
+              <a:ext uri="{FF2B5EF4-FFF2-40B4-BE49-F238E27FC236}">
+                <a16:creationId xmlns:a16="http://schemas.microsoft.com/office/drawing/2014/main" id="{1BB02CD1-5965-4305-80C8-21F44F51B152}"/>
               </a:ext>
             </a:extLst>
           </p:cNvPr>
@@ -33018,7 +33541,61 @@
         </p:nvSpPr>
         <p:spPr>
           <a:xfrm>
-            <a:off x="2964752" y="5007044"/>
+            <a:off x="0" y="4966763"/>
+            <a:ext cx="12192000" cy="277945"/>
+          </a:xfrm>
+          <a:prstGeom prst="rect">
+            <a:avLst/>
+          </a:prstGeom>
+          <a:solidFill>
+            <a:schemeClr val="bg1"/>
+          </a:solidFill>
+          <a:ln>
+            <a:solidFill>
+              <a:schemeClr val="bg1"/>
+            </a:solidFill>
+          </a:ln>
+        </p:spPr>
+        <p:style>
+          <a:lnRef idx="2">
+            <a:schemeClr val="accent1">
+              <a:shade val="50000"/>
+            </a:schemeClr>
+          </a:lnRef>
+          <a:fillRef idx="1">
+            <a:schemeClr val="accent1"/>
+          </a:fillRef>
+          <a:effectRef idx="0">
+            <a:schemeClr val="accent1"/>
+          </a:effectRef>
+          <a:fontRef idx="minor">
+            <a:schemeClr val="lt1"/>
+          </a:fontRef>
+        </p:style>
+        <p:txBody>
+          <a:bodyPr rtlCol="0" anchor="ctr"/>
+          <a:lstStyle/>
+          <a:p>
+            <a:pPr algn="ctr"/>
+            <a:endParaRPr lang="en-US"/>
+          </a:p>
+        </p:txBody>
+      </p:sp>
+      <p:sp>
+        <p:nvSpPr>
+          <p:cNvPr id="6" name="Rectangle: Rounded Corners 5">
+            <a:extLst>
+              <a:ext uri="{FF2B5EF4-FFF2-40B4-BE49-F238E27FC236}">
+                <a16:creationId xmlns:a16="http://schemas.microsoft.com/office/drawing/2014/main" id="{DBCCBCA9-A392-42E4-9F0C-A3CFC215C8EF}"/>
+              </a:ext>
+            </a:extLst>
+          </p:cNvPr>
+          <p:cNvSpPr/>
+          <p:nvPr/>
+        </p:nvSpPr>
+        <p:spPr>
+          <a:xfrm>
+            <a:off x="2964752" y="4620343"/>
             <a:ext cx="4745212" cy="354481"/>
           </a:xfrm>
           <a:prstGeom prst="roundRect">
@@ -33047,53 +33624,6 @@
           <a:p>
             <a:pPr algn="ctr"/>
             <a:endParaRPr lang="en-US"/>
-          </a:p>
-        </p:txBody>
-      </p:sp>
-      <p:sp>
-        <p:nvSpPr>
-          <p:cNvPr id="5" name="Arrow: Left 4">
-            <a:extLst>
-              <a:ext uri="{FF2B5EF4-FFF2-40B4-BE49-F238E27FC236}">
-                <a16:creationId xmlns:a16="http://schemas.microsoft.com/office/drawing/2014/main" id="{40BCAAE6-3D1C-4384-866B-9883EA640F1F}"/>
-              </a:ext>
-            </a:extLst>
-          </p:cNvPr>
-          <p:cNvSpPr/>
-          <p:nvPr/>
-        </p:nvSpPr>
-        <p:spPr>
-          <a:xfrm rot="21209117">
-            <a:off x="1123866" y="4801606"/>
-            <a:ext cx="914400" cy="487411"/>
-          </a:xfrm>
-          <a:prstGeom prst="leftArrow">
-            <a:avLst/>
-          </a:prstGeom>
-        </p:spPr>
-        <p:style>
-          <a:lnRef idx="1">
-            <a:schemeClr val="accent2"/>
-          </a:lnRef>
-          <a:fillRef idx="2">
-            <a:schemeClr val="accent2"/>
-          </a:fillRef>
-          <a:effectRef idx="1">
-            <a:schemeClr val="accent2"/>
-          </a:effectRef>
-          <a:fontRef idx="minor">
-            <a:schemeClr val="dk1"/>
-          </a:fontRef>
-        </p:style>
-        <p:txBody>
-          <a:bodyPr rtlCol="0" anchor="ctr"/>
-          <a:lstStyle/>
-          <a:p>
-            <a:pPr algn="ctr"/>
-            <a:r>
-              <a:rPr lang="en-US" dirty="0"/>
-              <a:t>you</a:t>
-            </a:r>
           </a:p>
         </p:txBody>
       </p:sp>
@@ -33205,8 +33735,8 @@
         </p:blipFill>
         <p:spPr>
           <a:xfrm>
-            <a:off x="53920" y="890005"/>
-            <a:ext cx="12084159" cy="5941482"/>
+            <a:off x="53921" y="902089"/>
+            <a:ext cx="12084157" cy="5941482"/>
           </a:xfrm>
           <a:prstGeom prst="rect">
             <a:avLst/>
@@ -33248,6 +33778,60 @@
           </a:effectRef>
           <a:fontRef idx="minor">
             <a:schemeClr val="dk1"/>
+          </a:fontRef>
+        </p:style>
+        <p:txBody>
+          <a:bodyPr rtlCol="0" anchor="ctr"/>
+          <a:lstStyle/>
+          <a:p>
+            <a:pPr algn="ctr"/>
+            <a:endParaRPr lang="en-US"/>
+          </a:p>
+        </p:txBody>
+      </p:sp>
+      <p:sp>
+        <p:nvSpPr>
+          <p:cNvPr id="7" name="Rectangle 6">
+            <a:extLst>
+              <a:ext uri="{FF2B5EF4-FFF2-40B4-BE49-F238E27FC236}">
+                <a16:creationId xmlns:a16="http://schemas.microsoft.com/office/drawing/2014/main" id="{907F6125-51F8-4A54-8289-C26C73C9C369}"/>
+              </a:ext>
+            </a:extLst>
+          </p:cNvPr>
+          <p:cNvSpPr/>
+          <p:nvPr/>
+        </p:nvSpPr>
+        <p:spPr>
+          <a:xfrm>
+            <a:off x="0" y="4974819"/>
+            <a:ext cx="12192000" cy="269889"/>
+          </a:xfrm>
+          <a:prstGeom prst="rect">
+            <a:avLst/>
+          </a:prstGeom>
+          <a:solidFill>
+            <a:schemeClr val="bg1"/>
+          </a:solidFill>
+          <a:ln>
+            <a:solidFill>
+              <a:schemeClr val="bg1"/>
+            </a:solidFill>
+          </a:ln>
+        </p:spPr>
+        <p:style>
+          <a:lnRef idx="2">
+            <a:schemeClr val="accent1">
+              <a:shade val="50000"/>
+            </a:schemeClr>
+          </a:lnRef>
+          <a:fillRef idx="1">
+            <a:schemeClr val="accent1"/>
+          </a:fillRef>
+          <a:effectRef idx="0">
+            <a:schemeClr val="accent1"/>
+          </a:effectRef>
+          <a:fontRef idx="minor">
+            <a:schemeClr val="lt1"/>
           </a:fontRef>
         </p:style>
         <p:txBody>
@@ -33529,8 +34113,8 @@
         </p:blipFill>
         <p:spPr>
           <a:xfrm>
-            <a:off x="53920" y="890005"/>
-            <a:ext cx="12084159" cy="5941482"/>
+            <a:off x="53922" y="890005"/>
+            <a:ext cx="12084155" cy="5941480"/>
           </a:xfrm>
           <a:prstGeom prst="rect">
             <a:avLst/>
@@ -33551,8 +34135,8 @@
         </p:nvSpPr>
         <p:spPr>
           <a:xfrm>
-            <a:off x="3444103" y="3831990"/>
-            <a:ext cx="1629913" cy="349275"/>
+            <a:off x="92648" y="4890227"/>
+            <a:ext cx="7581062" cy="354481"/>
           </a:xfrm>
           <a:prstGeom prst="roundRect">
             <a:avLst/>
@@ -33583,10 +34167,57 @@
           </a:p>
         </p:txBody>
       </p:sp>
+      <p:sp>
+        <p:nvSpPr>
+          <p:cNvPr id="7" name="Arrow: Left 6">
+            <a:extLst>
+              <a:ext uri="{FF2B5EF4-FFF2-40B4-BE49-F238E27FC236}">
+                <a16:creationId xmlns:a16="http://schemas.microsoft.com/office/drawing/2014/main" id="{74F1EAAF-C15B-40DF-9FC1-54ADCC4154F3}"/>
+              </a:ext>
+            </a:extLst>
+          </p:cNvPr>
+          <p:cNvSpPr/>
+          <p:nvPr/>
+        </p:nvSpPr>
+        <p:spPr>
+          <a:xfrm rot="21209117">
+            <a:off x="4032222" y="4725072"/>
+            <a:ext cx="914400" cy="487411"/>
+          </a:xfrm>
+          <a:prstGeom prst="leftArrow">
+            <a:avLst/>
+          </a:prstGeom>
+        </p:spPr>
+        <p:style>
+          <a:lnRef idx="1">
+            <a:schemeClr val="accent2"/>
+          </a:lnRef>
+          <a:fillRef idx="2">
+            <a:schemeClr val="accent2"/>
+          </a:fillRef>
+          <a:effectRef idx="1">
+            <a:schemeClr val="accent2"/>
+          </a:effectRef>
+          <a:fontRef idx="minor">
+            <a:schemeClr val="dk1"/>
+          </a:fontRef>
+        </p:style>
+        <p:txBody>
+          <a:bodyPr rtlCol="0" anchor="ctr"/>
+          <a:lstStyle/>
+          <a:p>
+            <a:pPr algn="ctr"/>
+            <a:r>
+              <a:rPr lang="en-US" dirty="0"/>
+              <a:t>you</a:t>
+            </a:r>
+          </a:p>
+        </p:txBody>
+      </p:sp>
     </p:spTree>
     <p:extLst>
       <p:ext uri="{BB962C8B-B14F-4D97-AF65-F5344CB8AC3E}">
-        <p14:creationId xmlns:p14="http://schemas.microsoft.com/office/powerpoint/2010/main" val="705997925"/>
+        <p14:creationId xmlns:p14="http://schemas.microsoft.com/office/powerpoint/2010/main" val="2889344360"/>
       </p:ext>
     </p:extLst>
   </p:cSld>
@@ -33692,7 +34323,7 @@
         <p:spPr>
           <a:xfrm>
             <a:off x="53922" y="890005"/>
-            <a:ext cx="12084155" cy="5941481"/>
+            <a:ext cx="12084155" cy="5941480"/>
           </a:xfrm>
           <a:prstGeom prst="rect">
             <a:avLst/>
@@ -33713,8 +34344,8 @@
         </p:nvSpPr>
         <p:spPr>
           <a:xfrm>
-            <a:off x="92648" y="5321243"/>
-            <a:ext cx="7581062" cy="354481"/>
+            <a:off x="10054372" y="4499493"/>
+            <a:ext cx="1377642" cy="890230"/>
           </a:xfrm>
           <a:prstGeom prst="roundRect">
             <a:avLst/>
@@ -33745,57 +34376,10 @@
           </a:p>
         </p:txBody>
       </p:sp>
-      <p:sp>
-        <p:nvSpPr>
-          <p:cNvPr id="7" name="Arrow: Left 6">
-            <a:extLst>
-              <a:ext uri="{FF2B5EF4-FFF2-40B4-BE49-F238E27FC236}">
-                <a16:creationId xmlns:a16="http://schemas.microsoft.com/office/drawing/2014/main" id="{74F1EAAF-C15B-40DF-9FC1-54ADCC4154F3}"/>
-              </a:ext>
-            </a:extLst>
-          </p:cNvPr>
-          <p:cNvSpPr/>
-          <p:nvPr/>
-        </p:nvSpPr>
-        <p:spPr>
-          <a:xfrm rot="21209117">
-            <a:off x="4032222" y="5156088"/>
-            <a:ext cx="914400" cy="487411"/>
-          </a:xfrm>
-          <a:prstGeom prst="leftArrow">
-            <a:avLst/>
-          </a:prstGeom>
-        </p:spPr>
-        <p:style>
-          <a:lnRef idx="1">
-            <a:schemeClr val="accent2"/>
-          </a:lnRef>
-          <a:fillRef idx="2">
-            <a:schemeClr val="accent2"/>
-          </a:fillRef>
-          <a:effectRef idx="1">
-            <a:schemeClr val="accent2"/>
-          </a:effectRef>
-          <a:fontRef idx="minor">
-            <a:schemeClr val="dk1"/>
-          </a:fontRef>
-        </p:style>
-        <p:txBody>
-          <a:bodyPr rtlCol="0" anchor="ctr"/>
-          <a:lstStyle/>
-          <a:p>
-            <a:pPr algn="ctr"/>
-            <a:r>
-              <a:rPr lang="en-US" dirty="0"/>
-              <a:t>you</a:t>
-            </a:r>
-          </a:p>
-        </p:txBody>
-      </p:sp>
     </p:spTree>
     <p:extLst>
       <p:ext uri="{BB962C8B-B14F-4D97-AF65-F5344CB8AC3E}">
-        <p14:creationId xmlns:p14="http://schemas.microsoft.com/office/powerpoint/2010/main" val="2889344360"/>
+        <p14:creationId xmlns:p14="http://schemas.microsoft.com/office/powerpoint/2010/main" val="3695294753"/>
       </p:ext>
     </p:extLst>
   </p:cSld>
@@ -34468,7 +35052,11 @@
           </p:cNvGraphicFramePr>
           <p:nvPr>
             <p:ph idx="1"/>
-            <p:extLst/>
+            <p:extLst>
+              <p:ext uri="{D42A27DB-BD31-4B8C-83A1-F6EECF244321}">
+                <p14:modId xmlns:p14="http://schemas.microsoft.com/office/powerpoint/2010/main" val="1933566511"/>
+              </p:ext>
+            </p:extLst>
           </p:nvPr>
         </p:nvGraphicFramePr>
         <p:xfrm>
@@ -34523,7 +35111,7 @@
             <a:pPr algn="ctr"/>
             <a:r>
               <a:rPr lang="en-US" b="1" dirty="0"/>
-              <a:t>$10 – $95</a:t>
+              <a:t>$10 – $145</a:t>
             </a:r>
           </a:p>
         </p:txBody>

</xml_diff>